<commit_message>
Data cleansing added in presentation
</commit_message>
<xml_diff>
--- a/Presentation.pptx
+++ b/Presentation.pptx
@@ -6,6 +6,8 @@
   </p:sldMasterIdLst>
   <p:sldIdLst>
     <p:sldId id="256" r:id="rId2"/>
+    <p:sldId id="257" r:id="rId3"/>
+    <p:sldId id="258" r:id="rId4"/>
   </p:sldIdLst>
   <p:sldSz cx="12192000" cy="6858000"/>
   <p:notesSz cx="6858000" cy="9144000"/>
@@ -104,6 +106,11 @@
       </a:defRPr>
     </a:lvl9pPr>
   </p:defaultTextStyle>
+  <p:extLst>
+    <p:ext uri="{EFAFB233-063F-42B5-8137-9DF3F51BA10A}">
+      <p15:sldGuideLst xmlns:p15="http://schemas.microsoft.com/office/powerpoint/2012/main"/>
+    </p:ext>
+  </p:extLst>
 </p:presentation>
 </file>
 
@@ -3427,7 +3434,7 @@
         <p:spPr>
           <a:xfrm>
             <a:off x="575534" y="1688951"/>
-            <a:ext cx="9893542" cy="3385542"/>
+            <a:ext cx="9893542" cy="4031873"/>
           </a:xfrm>
           <a:prstGeom prst="rect">
             <a:avLst/>
@@ -3441,6 +3448,15 @@
           <a:lstStyle/>
           <a:p>
             <a:r>
+              <a:rPr lang="en-IN" sz="1600" b="1" dirty="0"/>
+              <a:t>Overview</a:t>
+            </a:r>
+          </a:p>
+          <a:p>
+            <a:endParaRPr lang="en-IN" sz="1400" b="1" u="sng" dirty="0"/>
+          </a:p>
+          <a:p>
+            <a:r>
               <a:rPr lang="en-IN" sz="1400" dirty="0"/>
               <a:t>The company lends loans to urban customers, for the loan provided to the customer there are two probable outcomes:</a:t>
             </a:r>
@@ -3449,7 +3465,7 @@
             <a:endParaRPr lang="en-IN" sz="1400" dirty="0"/>
           </a:p>
           <a:p>
-            <a:pPr marL="285750" indent="-285750">
+            <a:pPr marL="742950" lvl="1" indent="-285750">
               <a:buFont typeface="Arial" panose="020B0604020202020204" pitchFamily="34" charset="0"/>
               <a:buChar char="•"/>
             </a:pPr>
@@ -3459,7 +3475,7 @@
             </a:r>
           </a:p>
           <a:p>
-            <a:pPr marL="285750" indent="-285750">
+            <a:pPr marL="742950" lvl="1" indent="-285750">
               <a:buFont typeface="Arial" panose="020B0604020202020204" pitchFamily="34" charset="0"/>
               <a:buChar char="•"/>
             </a:pPr>
@@ -3485,7 +3501,7 @@
             <a:endParaRPr lang="en-US" sz="1400" dirty="0"/>
           </a:p>
           <a:p>
-            <a:pPr marL="285750" indent="-285750">
+            <a:pPr marL="742950" lvl="1" indent="-285750">
               <a:buFont typeface="Arial" panose="020B0604020202020204" pitchFamily="34" charset="0"/>
               <a:buChar char="•"/>
             </a:pPr>
@@ -3519,9 +3535,12 @@
           </a:p>
           <a:p>
             <a:r>
-              <a:rPr lang="en-US" sz="1400" dirty="0"/>
-              <a:t>Data Analyzed:</a:t>
-            </a:r>
+              <a:rPr lang="en-US" sz="1600" b="1" dirty="0"/>
+              <a:t>Data Analyzed</a:t>
+            </a:r>
+          </a:p>
+          <a:p>
+            <a:endParaRPr lang="en-US" sz="1400" b="1" u="sng" dirty="0"/>
           </a:p>
           <a:p>
             <a:r>
@@ -3530,15 +3549,7 @@
             </a:r>
             <a:r>
               <a:rPr lang="en-IN" sz="1400" dirty="0"/>
-              <a:t>for all loans issued through the time period </a:t>
-            </a:r>
-            <a:r>
-              <a:rPr lang="en-IN" sz="1400"/>
-              <a:t>2007 to </a:t>
-            </a:r>
-            <a:r>
-              <a:rPr lang="en-IN" sz="1400" dirty="0"/>
-              <a:t>2011.</a:t>
+              <a:t>for all loans issued through the time period 2007 to 2011.</a:t>
             </a:r>
             <a:endParaRPr lang="en-US" sz="1400" dirty="0"/>
           </a:p>
@@ -3551,6 +3562,362 @@
     <p:extLst>
       <p:ext uri="{BB962C8B-B14F-4D97-AF65-F5344CB8AC3E}">
         <p14:creationId xmlns:p14="http://schemas.microsoft.com/office/powerpoint/2010/main" val="963095462"/>
+      </p:ext>
+    </p:extLst>
+  </p:cSld>
+  <p:clrMapOvr>
+    <a:masterClrMapping/>
+  </p:clrMapOvr>
+</p:sld>
+</file>
+
+<file path=ppt/slides/slide2.xml><?xml version="1.0" encoding="utf-8"?>
+<p:sld xmlns:a="http://schemas.openxmlformats.org/drawingml/2006/main" xmlns:r="http://schemas.openxmlformats.org/officeDocument/2006/relationships" xmlns:p="http://schemas.openxmlformats.org/presentationml/2006/main">
+  <p:cSld>
+    <p:spTree>
+      <p:nvGrpSpPr>
+        <p:cNvPr id="1" name=""/>
+        <p:cNvGrpSpPr/>
+        <p:nvPr/>
+      </p:nvGrpSpPr>
+      <p:grpSpPr>
+        <a:xfrm>
+          <a:off x="0" y="0"/>
+          <a:ext cx="0" cy="0"/>
+          <a:chOff x="0" y="0"/>
+          <a:chExt cx="0" cy="0"/>
+        </a:xfrm>
+      </p:grpSpPr>
+      <p:sp>
+        <p:nvSpPr>
+          <p:cNvPr id="5" name="TextBox 4">
+            <a:extLst>
+              <a:ext uri="{FF2B5EF4-FFF2-40B4-BE49-F238E27FC236}">
+                <a16:creationId xmlns:a16="http://schemas.microsoft.com/office/drawing/2014/main" id="{06E7B33A-015F-796F-C44B-B0196244ACA7}"/>
+              </a:ext>
+            </a:extLst>
+          </p:cNvPr>
+          <p:cNvSpPr txBox="1"/>
+          <p:nvPr/>
+        </p:nvSpPr>
+        <p:spPr>
+          <a:xfrm>
+            <a:off x="392655" y="277913"/>
+            <a:ext cx="6099586" cy="461665"/>
+          </a:xfrm>
+          <a:prstGeom prst="rect">
+            <a:avLst/>
+          </a:prstGeom>
+          <a:noFill/>
+        </p:spPr>
+        <p:txBody>
+          <a:bodyPr wrap="square">
+            <a:spAutoFit/>
+          </a:bodyPr>
+          <a:lstStyle/>
+          <a:p>
+            <a:pPr>
+              <a:buNone/>
+            </a:pPr>
+            <a:r>
+              <a:rPr lang="en-IN" sz="2400" b="1" dirty="0">
+                <a:solidFill>
+                  <a:srgbClr val="000000"/>
+                </a:solidFill>
+                <a:effectLst/>
+                <a:latin typeface="Times New Roman" panose="02020603050405020304" pitchFamily="18" charset="0"/>
+              </a:rPr>
+              <a:t>Data Preparation</a:t>
+            </a:r>
+            <a:endParaRPr lang="en-IN" sz="2400" dirty="0">
+              <a:solidFill>
+                <a:srgbClr val="000000"/>
+              </a:solidFill>
+              <a:effectLst/>
+              <a:latin typeface="Times New Roman" panose="02020603050405020304" pitchFamily="18" charset="0"/>
+            </a:endParaRPr>
+          </a:p>
+        </p:txBody>
+      </p:sp>
+      <p:sp>
+        <p:nvSpPr>
+          <p:cNvPr id="6" name="TextBox 5">
+            <a:extLst>
+              <a:ext uri="{FF2B5EF4-FFF2-40B4-BE49-F238E27FC236}">
+                <a16:creationId xmlns:a16="http://schemas.microsoft.com/office/drawing/2014/main" id="{6047D282-9E60-3196-2929-323535127823}"/>
+              </a:ext>
+            </a:extLst>
+          </p:cNvPr>
+          <p:cNvSpPr txBox="1"/>
+          <p:nvPr/>
+        </p:nvSpPr>
+        <p:spPr>
+          <a:xfrm>
+            <a:off x="559398" y="1215614"/>
+            <a:ext cx="10671586" cy="4924425"/>
+          </a:xfrm>
+          <a:prstGeom prst="rect">
+            <a:avLst/>
+          </a:prstGeom>
+          <a:noFill/>
+        </p:spPr>
+        <p:txBody>
+          <a:bodyPr wrap="square" rtlCol="0">
+            <a:spAutoFit/>
+          </a:bodyPr>
+          <a:lstStyle/>
+          <a:p>
+            <a:r>
+              <a:rPr lang="en-US" sz="1600" b="1" dirty="0"/>
+              <a:t>Data Cleansing</a:t>
+            </a:r>
+          </a:p>
+          <a:p>
+            <a:endParaRPr lang="en-US" sz="1600" b="1" dirty="0"/>
+          </a:p>
+          <a:p>
+            <a:pPr marL="742950" lvl="1" indent="-285750">
+              <a:buFont typeface="Arial" panose="020B0604020202020204" pitchFamily="34" charset="0"/>
+              <a:buChar char="•"/>
+            </a:pPr>
+            <a:r>
+              <a:rPr lang="en-US" sz="1400" dirty="0"/>
+              <a:t>Data has </a:t>
+            </a:r>
+            <a:r>
+              <a:rPr lang="en-IN" sz="1400" dirty="0"/>
+              <a:t>39717 rows and 111 columns</a:t>
+            </a:r>
+          </a:p>
+          <a:p>
+            <a:pPr marL="742950" lvl="1" indent="-285750">
+              <a:buFont typeface="Arial" panose="020B0604020202020204" pitchFamily="34" charset="0"/>
+              <a:buChar char="•"/>
+            </a:pPr>
+            <a:r>
+              <a:rPr lang="en-IN" sz="1400" dirty="0"/>
+              <a:t>For the sake of having a clearer view we set a threshold of 75% non-null values to keep it in scope of analysis</a:t>
+            </a:r>
+          </a:p>
+          <a:p>
+            <a:pPr marL="742950" lvl="1" indent="-285750">
+              <a:buFont typeface="Arial" panose="020B0604020202020204" pitchFamily="34" charset="0"/>
+              <a:buChar char="•"/>
+            </a:pPr>
+            <a:r>
+              <a:rPr lang="en-IN" sz="1400" dirty="0"/>
+              <a:t>On deleting columns with more than 75% null values, 55 columns remain in the scope of analysis</a:t>
+            </a:r>
+          </a:p>
+          <a:p>
+            <a:pPr marL="285750" indent="-285750">
+              <a:buFont typeface="Arial" panose="020B0604020202020204" pitchFamily="34" charset="0"/>
+              <a:buChar char="•"/>
+            </a:pPr>
+            <a:endParaRPr lang="en-IN" sz="1400" dirty="0"/>
+          </a:p>
+          <a:p>
+            <a:pPr marL="742950" lvl="1" indent="-285750">
+              <a:buFont typeface="Arial" panose="020B0604020202020204" pitchFamily="34" charset="0"/>
+              <a:buChar char="•"/>
+            </a:pPr>
+            <a:r>
+              <a:rPr lang="en-IN" sz="1400" dirty="0"/>
+              <a:t>On taking a deeper look at the columns 8 more columns can be dropped,</a:t>
+            </a:r>
+          </a:p>
+          <a:p>
+            <a:pPr marL="1085850" lvl="2" indent="-171450">
+              <a:buFont typeface="Arial" panose="020B0604020202020204" pitchFamily="34" charset="0"/>
+              <a:buChar char="•"/>
+            </a:pPr>
+            <a:r>
+              <a:rPr lang="en-IN" sz="1200" dirty="0"/>
+              <a:t>['pymnt_plan','initial_list_status','collections_12_mths_ex_med','policy_code','application_type','acc_now_delinq','chargeoff_within_12_mths','tax_liens’]</a:t>
+            </a:r>
+          </a:p>
+          <a:p>
+            <a:pPr marL="1085850" lvl="2" indent="-171450">
+              <a:buFont typeface="Arial" panose="020B0604020202020204" pitchFamily="34" charset="0"/>
+              <a:buChar char="•"/>
+            </a:pPr>
+            <a:r>
+              <a:rPr lang="en-IN" sz="1400" dirty="0"/>
+              <a:t>Because all of these columns has one single value in all rows.</a:t>
+            </a:r>
+          </a:p>
+          <a:p>
+            <a:pPr marL="285750" indent="-285750">
+              <a:buFont typeface="Arial" panose="020B0604020202020204" pitchFamily="34" charset="0"/>
+              <a:buChar char="•"/>
+            </a:pPr>
+            <a:endParaRPr lang="en-IN" sz="1400" dirty="0"/>
+          </a:p>
+          <a:p>
+            <a:r>
+              <a:rPr lang="en-IN" sz="1600" b="1" dirty="0"/>
+              <a:t>Null value processing and Derived Columns</a:t>
+            </a:r>
+          </a:p>
+          <a:p>
+            <a:pPr lvl="1"/>
+            <a:endParaRPr lang="en-IN" sz="1400" dirty="0"/>
+          </a:p>
+          <a:p>
+            <a:pPr marL="742950" lvl="1" indent="-285750">
+              <a:buFont typeface="Arial" panose="020B0604020202020204" pitchFamily="34" charset="0"/>
+              <a:buChar char="•"/>
+            </a:pPr>
+            <a:r>
+              <a:rPr lang="en-IN" sz="1400" dirty="0"/>
+              <a:t>Columns: term, </a:t>
+            </a:r>
+            <a:r>
+              <a:rPr lang="en-IN" sz="1400" dirty="0" err="1"/>
+              <a:t>int_rate</a:t>
+            </a:r>
+            <a:r>
+              <a:rPr lang="en-IN" sz="1400" dirty="0"/>
+              <a:t>, </a:t>
+            </a:r>
+            <a:r>
+              <a:rPr lang="en-IN" sz="1400" dirty="0" err="1"/>
+              <a:t>revol_util</a:t>
+            </a:r>
+            <a:r>
+              <a:rPr lang="en-IN" sz="1400" dirty="0"/>
+              <a:t> are object in data set and are be converted to numeric types int64 and float64</a:t>
+            </a:r>
+          </a:p>
+          <a:p>
+            <a:pPr marL="742950" lvl="1" indent="-285750">
+              <a:buFont typeface="Arial" panose="020B0604020202020204" pitchFamily="34" charset="0"/>
+              <a:buChar char="•"/>
+            </a:pPr>
+            <a:r>
+              <a:rPr lang="en-IN" sz="1400" dirty="0" err="1"/>
+              <a:t>emp_length_int</a:t>
+            </a:r>
+            <a:r>
+              <a:rPr lang="en-IN" sz="1400" dirty="0"/>
+              <a:t> (int64) is created from </a:t>
+            </a:r>
+            <a:r>
+              <a:rPr lang="en-IN" sz="1400" dirty="0" err="1"/>
+              <a:t>emp_length</a:t>
+            </a:r>
+            <a:r>
+              <a:rPr lang="en-IN" sz="1400" dirty="0"/>
+              <a:t> (object)</a:t>
+            </a:r>
+          </a:p>
+          <a:p>
+            <a:pPr marL="742950" lvl="1" indent="-285750">
+              <a:buFont typeface="Arial" panose="020B0604020202020204" pitchFamily="34" charset="0"/>
+              <a:buChar char="•"/>
+            </a:pPr>
+            <a:r>
+              <a:rPr lang="en-IN" sz="1400" dirty="0" err="1"/>
+              <a:t>earliest_cr_line</a:t>
+            </a:r>
+            <a:r>
+              <a:rPr lang="en-IN" sz="1400" dirty="0"/>
+              <a:t> is MON_YER (JAN-07) kind of date in data set, converted it to year</a:t>
+            </a:r>
+          </a:p>
+          <a:p>
+            <a:pPr marL="742950" lvl="1" indent="-285750">
+              <a:buFont typeface="Arial" panose="020B0604020202020204" pitchFamily="34" charset="0"/>
+              <a:buChar char="•"/>
+            </a:pPr>
+            <a:r>
+              <a:rPr lang="en-IN" sz="1400" dirty="0" err="1"/>
+              <a:t>pub_rec_bankruptcies</a:t>
+            </a:r>
+            <a:r>
+              <a:rPr lang="en-IN" sz="1400" dirty="0"/>
+              <a:t> </a:t>
+            </a:r>
+            <a:r>
+              <a:rPr lang="en-IN" sz="1400" dirty="0" err="1"/>
+              <a:t>nll</a:t>
+            </a:r>
+            <a:r>
+              <a:rPr lang="en-IN" sz="1400" dirty="0"/>
+              <a:t> values are filled with 0</a:t>
+            </a:r>
+          </a:p>
+          <a:p>
+            <a:pPr marL="742950" lvl="1" indent="-285750">
+              <a:buFont typeface="Arial" panose="020B0604020202020204" pitchFamily="34" charset="0"/>
+              <a:buChar char="•"/>
+            </a:pPr>
+            <a:endParaRPr lang="en-IN" sz="1400" dirty="0"/>
+          </a:p>
+          <a:p>
+            <a:pPr marL="742950" lvl="1" indent="-285750">
+              <a:buFont typeface="Arial" panose="020B0604020202020204" pitchFamily="34" charset="0"/>
+              <a:buChar char="•"/>
+            </a:pPr>
+            <a:endParaRPr lang="en-IN" sz="1400" dirty="0"/>
+          </a:p>
+          <a:p>
+            <a:pPr marL="742950" lvl="1" indent="-285750">
+              <a:buFont typeface="Arial" panose="020B0604020202020204" pitchFamily="34" charset="0"/>
+              <a:buChar char="•"/>
+            </a:pPr>
+            <a:endParaRPr lang="en-IN" sz="1400" dirty="0"/>
+          </a:p>
+          <a:p>
+            <a:pPr marL="628650" lvl="1" indent="-171450">
+              <a:buFont typeface="Arial" panose="020B0604020202020204" pitchFamily="34" charset="0"/>
+              <a:buChar char="•"/>
+            </a:pPr>
+            <a:endParaRPr lang="en-IN" sz="1400" dirty="0"/>
+          </a:p>
+          <a:p>
+            <a:pPr marL="628650" lvl="1" indent="-171450">
+              <a:buFont typeface="Arial" panose="020B0604020202020204" pitchFamily="34" charset="0"/>
+              <a:buChar char="•"/>
+            </a:pPr>
+            <a:endParaRPr lang="en-IN" sz="1400" dirty="0"/>
+          </a:p>
+        </p:txBody>
+      </p:sp>
+    </p:spTree>
+    <p:extLst>
+      <p:ext uri="{BB962C8B-B14F-4D97-AF65-F5344CB8AC3E}">
+        <p14:creationId xmlns:p14="http://schemas.microsoft.com/office/powerpoint/2010/main" val="2122701782"/>
+      </p:ext>
+    </p:extLst>
+  </p:cSld>
+  <p:clrMapOvr>
+    <a:masterClrMapping/>
+  </p:clrMapOvr>
+</p:sld>
+</file>
+
+<file path=ppt/slides/slide3.xml><?xml version="1.0" encoding="utf-8"?>
+<p:sld xmlns:a="http://schemas.openxmlformats.org/drawingml/2006/main" xmlns:r="http://schemas.openxmlformats.org/officeDocument/2006/relationships" xmlns:p="http://schemas.openxmlformats.org/presentationml/2006/main">
+  <p:cSld>
+    <p:spTree>
+      <p:nvGrpSpPr>
+        <p:cNvPr id="1" name=""/>
+        <p:cNvGrpSpPr/>
+        <p:nvPr/>
+      </p:nvGrpSpPr>
+      <p:grpSpPr>
+        <a:xfrm>
+          <a:off x="0" y="0"/>
+          <a:ext cx="0" cy="0"/>
+          <a:chOff x="0" y="0"/>
+          <a:chExt cx="0" cy="0"/>
+        </a:xfrm>
+      </p:grpSpPr>
+    </p:spTree>
+    <p:extLst>
+      <p:ext uri="{BB962C8B-B14F-4D97-AF65-F5344CB8AC3E}">
+        <p14:creationId xmlns:p14="http://schemas.microsoft.com/office/powerpoint/2010/main" val="4172811056"/>
       </p:ext>
     </p:extLst>
   </p:cSld>

</xml_diff>